<commit_message>
implicitly data type,OI, AT
</commit_message>
<xml_diff>
--- a/1. Document/Slides/05-Implicitly Typed Variables.pptx
+++ b/1. Document/Slides/05-Implicitly Typed Variables.pptx
@@ -212,7 +212,7 @@
           <a:p>
             <a:fld id="{749F7025-33D9-4E9F-9955-A14222A03D05}" type="datetimeFigureOut">
               <a:rPr lang="en-US" smtClean="0"/>
-              <a:t>8/16/2024</a:t>
+              <a:t>1/18/2025</a:t>
             </a:fld>
             <a:endParaRPr lang="en-US"/>
           </a:p>
@@ -607,9 +607,33 @@
           <a:bodyPr/>
           <a:lstStyle/>
           <a:p>
+            <a:pPr marL="171450" indent="-171450">
+              <a:buFontTx/>
+              <a:buChar char="-"/>
+            </a:pPr>
             <a:r>
               <a:rPr lang="en-US" dirty="0"/>
-              <a:t>- kiểu dữ liệu nội suy</a:t>
+              <a:t>kiểu dữ liệu nội suy</a:t>
+            </a:r>
+          </a:p>
+          <a:p>
+            <a:pPr marL="171450" indent="-171450">
+              <a:buFontTx/>
+              <a:buChar char="-"/>
+            </a:pPr>
+            <a:r>
+              <a:rPr lang="en-US" dirty="0"/>
+              <a:t>Khi khởi tạo không cần chỉ định rõ kiểu dữ liệu, </a:t>
+            </a:r>
+          </a:p>
+          <a:p>
+            <a:pPr marL="171450" indent="-171450">
+              <a:buFontTx/>
+              <a:buChar char="-"/>
+            </a:pPr>
+            <a:r>
+              <a:rPr lang="en-US" dirty="0"/>
+              <a:t>Datatype sẽ tự nội suy</a:t>
             </a:r>
           </a:p>
         </p:txBody>
@@ -694,6 +718,166 @@
           <a:bodyPr/>
           <a:lstStyle/>
           <a:p>
+            <a:pPr marL="171450" indent="-171450">
+              <a:buFontTx/>
+              <a:buChar char="-"/>
+            </a:pPr>
+            <a:r>
+              <a:rPr lang="en-US" dirty="0"/>
+              <a:t>Luôn khai báo datatype cho biến nếu biết chính xác nên dùng datatype nào cho biến đó</a:t>
+            </a:r>
+          </a:p>
+          <a:p>
+            <a:pPr marL="171450" indent="-171450">
+              <a:buFontTx/>
+              <a:buChar char="-"/>
+            </a:pPr>
+            <a:r>
+              <a:rPr lang="en-US" dirty="0" err="1"/>
+              <a:t>Kdl</a:t>
+            </a:r>
+            <a:r>
+              <a:rPr lang="en-US" dirty="0"/>
+              <a:t> ngầm định sử dụng phù hợp trong LINQ </a:t>
+            </a:r>
+          </a:p>
+          <a:p>
+            <a:pPr marL="171450" indent="-171450">
+              <a:buFontTx/>
+              <a:buChar char="-"/>
+            </a:pPr>
+            <a:r>
+              <a:rPr lang="en-US" dirty="0"/>
+              <a:t>Phải khởi tạo </a:t>
+            </a:r>
+            <a:r>
+              <a:rPr lang="en-US" dirty="0" err="1"/>
+              <a:t>gt</a:t>
+            </a:r>
+            <a:r>
+              <a:rPr lang="en-US" dirty="0"/>
+              <a:t> khi khai báo</a:t>
+            </a:r>
+          </a:p>
+          <a:p>
+            <a:pPr marL="171450" indent="-171450">
+              <a:buFontTx/>
+              <a:buChar char="-"/>
+            </a:pPr>
+            <a:r>
+              <a:rPr lang="en-US" dirty="0"/>
+              <a:t>Ko thể thay đổi </a:t>
+            </a:r>
+            <a:r>
+              <a:rPr lang="en-US" dirty="0" err="1"/>
+              <a:t>kdl</a:t>
+            </a:r>
+            <a:endParaRPr lang="en-US" dirty="0"/>
+          </a:p>
+          <a:p>
+            <a:pPr marL="171450" indent="-171450">
+              <a:buFontTx/>
+              <a:buChar char="-"/>
+            </a:pPr>
+            <a:r>
+              <a:rPr lang="en-US" dirty="0"/>
+              <a:t>Không thể sử dụng như </a:t>
+            </a:r>
+            <a:r>
+              <a:rPr lang="en-US"/>
+              <a:t>1 tham số biến</a:t>
+            </a:r>
+            <a:endParaRPr lang="en-US" dirty="0"/>
+          </a:p>
+          <a:p>
+            <a:pPr marL="171450" indent="-171450">
+              <a:buFontTx/>
+              <a:buChar char="-"/>
+            </a:pPr>
+            <a:endParaRPr lang="en-US" dirty="0"/>
+          </a:p>
+        </p:txBody>
+      </p:sp>
+      <p:sp>
+        <p:nvSpPr>
+          <p:cNvPr id="4" name="Slide Number Placeholder 3"/>
+          <p:cNvSpPr>
+            <a:spLocks noGrp="1"/>
+          </p:cNvSpPr>
+          <p:nvPr>
+            <p:ph type="sldNum" sz="quarter" idx="5"/>
+          </p:nvPr>
+        </p:nvSpPr>
+        <p:spPr/>
+        <p:txBody>
+          <a:bodyPr/>
+          <a:lstStyle/>
+          <a:p>
+            <a:fld id="{46D3E3EA-CC6A-448F-83C3-9A526F33CF9E}" type="slidenum">
+              <a:rPr lang="en-US" smtClean="0"/>
+              <a:t>4</a:t>
+            </a:fld>
+            <a:endParaRPr lang="en-US"/>
+          </a:p>
+        </p:txBody>
+      </p:sp>
+    </p:spTree>
+    <p:extLst>
+      <p:ext uri="{BB962C8B-B14F-4D97-AF65-F5344CB8AC3E}">
+        <p14:creationId xmlns:p14="http://schemas.microsoft.com/office/powerpoint/2010/main" val="3998921264"/>
+      </p:ext>
+    </p:extLst>
+  </p:cSld>
+  <p:clrMapOvr>
+    <a:masterClrMapping/>
+  </p:clrMapOvr>
+</p:notes>
+</file>
+
+<file path=ppt/notesSlides/notesSlide4.xml><?xml version="1.0" encoding="utf-8"?>
+<p:notes xmlns:a="http://schemas.openxmlformats.org/drawingml/2006/main" xmlns:r="http://schemas.openxmlformats.org/officeDocument/2006/relationships" xmlns:p="http://schemas.openxmlformats.org/presentationml/2006/main">
+  <p:cSld>
+    <p:spTree>
+      <p:nvGrpSpPr>
+        <p:cNvPr id="1" name=""/>
+        <p:cNvGrpSpPr/>
+        <p:nvPr/>
+      </p:nvGrpSpPr>
+      <p:grpSpPr>
+        <a:xfrm>
+          <a:off x="0" y="0"/>
+          <a:ext cx="0" cy="0"/>
+          <a:chOff x="0" y="0"/>
+          <a:chExt cx="0" cy="0"/>
+        </a:xfrm>
+      </p:grpSpPr>
+      <p:sp>
+        <p:nvSpPr>
+          <p:cNvPr id="2" name="Slide Image Placeholder 1"/>
+          <p:cNvSpPr>
+            <a:spLocks noGrp="1" noRot="1" noChangeAspect="1"/>
+          </p:cNvSpPr>
+          <p:nvPr>
+            <p:ph type="sldImg"/>
+          </p:nvPr>
+        </p:nvSpPr>
+        <p:spPr/>
+      </p:sp>
+      <p:sp>
+        <p:nvSpPr>
+          <p:cNvPr id="3" name="Notes Placeholder 2"/>
+          <p:cNvSpPr>
+            <a:spLocks noGrp="1"/>
+          </p:cNvSpPr>
+          <p:nvPr>
+            <p:ph type="body" idx="1"/>
+          </p:nvPr>
+        </p:nvSpPr>
+        <p:spPr/>
+        <p:txBody>
+          <a:bodyPr/>
+          <a:lstStyle/>
+          <a:p>
             <a:endParaRPr lang="en-US"/>
           </a:p>
         </p:txBody>
@@ -913,7 +1097,7 @@
           <a:p>
             <a:fld id="{1ADF62C2-72EA-4953-A1D6-568F980002B8}" type="datetimeFigureOut">
               <a:rPr lang="en-US" smtClean="0"/>
-              <a:t>8/16/2024</a:t>
+              <a:t>1/18/2025</a:t>
             </a:fld>
             <a:endParaRPr lang="en-US"/>
           </a:p>
@@ -1081,7 +1265,7 @@
           <a:p>
             <a:fld id="{1ADF62C2-72EA-4953-A1D6-568F980002B8}" type="datetimeFigureOut">
               <a:rPr lang="en-US" smtClean="0"/>
-              <a:t>8/16/2024</a:t>
+              <a:t>1/18/2025</a:t>
             </a:fld>
             <a:endParaRPr lang="en-US"/>
           </a:p>
@@ -1259,7 +1443,7 @@
           <a:p>
             <a:fld id="{1ADF62C2-72EA-4953-A1D6-568F980002B8}" type="datetimeFigureOut">
               <a:rPr lang="en-US" smtClean="0"/>
-              <a:t>8/16/2024</a:t>
+              <a:t>1/18/2025</a:t>
             </a:fld>
             <a:endParaRPr lang="en-US"/>
           </a:p>
@@ -1891,7 +2075,7 @@
           <a:p>
             <a:fld id="{1ADF62C2-72EA-4953-A1D6-568F980002B8}" type="datetimeFigureOut">
               <a:rPr lang="en-US" smtClean="0"/>
-              <a:t>8/16/2024</a:t>
+              <a:t>1/18/2025</a:t>
             </a:fld>
             <a:endParaRPr lang="en-US"/>
           </a:p>
@@ -2176,7 +2360,7 @@
           <a:p>
             <a:fld id="{1ADF62C2-72EA-4953-A1D6-568F980002B8}" type="datetimeFigureOut">
               <a:rPr lang="en-US" smtClean="0"/>
-              <a:t>8/16/2024</a:t>
+              <a:t>1/18/2025</a:t>
             </a:fld>
             <a:endParaRPr lang="en-US"/>
           </a:p>
@@ -2595,7 +2779,7 @@
           <a:p>
             <a:fld id="{1ADF62C2-72EA-4953-A1D6-568F980002B8}" type="datetimeFigureOut">
               <a:rPr lang="en-US" smtClean="0"/>
-              <a:t>8/16/2024</a:t>
+              <a:t>1/18/2025</a:t>
             </a:fld>
             <a:endParaRPr lang="en-US"/>
           </a:p>
@@ -2712,7 +2896,7 @@
           <a:p>
             <a:fld id="{1ADF62C2-72EA-4953-A1D6-568F980002B8}" type="datetimeFigureOut">
               <a:rPr lang="en-US" smtClean="0"/>
-              <a:t>8/16/2024</a:t>
+              <a:t>1/18/2025</a:t>
             </a:fld>
             <a:endParaRPr lang="en-US"/>
           </a:p>
@@ -2807,7 +2991,7 @@
           <a:p>
             <a:fld id="{1ADF62C2-72EA-4953-A1D6-568F980002B8}" type="datetimeFigureOut">
               <a:rPr lang="en-US" smtClean="0"/>
-              <a:t>8/16/2024</a:t>
+              <a:t>1/18/2025</a:t>
             </a:fld>
             <a:endParaRPr lang="en-US"/>
           </a:p>
@@ -3082,7 +3266,7 @@
           <a:p>
             <a:fld id="{1ADF62C2-72EA-4953-A1D6-568F980002B8}" type="datetimeFigureOut">
               <a:rPr lang="en-US" smtClean="0"/>
-              <a:t>8/16/2024</a:t>
+              <a:t>1/18/2025</a:t>
             </a:fld>
             <a:endParaRPr lang="en-US"/>
           </a:p>
@@ -3334,7 +3518,7 @@
           <a:p>
             <a:fld id="{1ADF62C2-72EA-4953-A1D6-568F980002B8}" type="datetimeFigureOut">
               <a:rPr lang="en-US" smtClean="0"/>
-              <a:t>8/16/2024</a:t>
+              <a:t>1/18/2025</a:t>
             </a:fld>
             <a:endParaRPr lang="en-US"/>
           </a:p>
@@ -3545,7 +3729,7 @@
           <a:p>
             <a:fld id="{1ADF62C2-72EA-4953-A1D6-568F980002B8}" type="datetimeFigureOut">
               <a:rPr lang="en-US" smtClean="0"/>
-              <a:t>8/16/2024</a:t>
+              <a:t>1/18/2025</a:t>
             </a:fld>
             <a:endParaRPr lang="en-US"/>
           </a:p>
@@ -4086,7 +4270,7 @@
               <a:defRPr/>
             </a:pPr>
             <a:r>
-              <a:rPr lang="en-US" kern="0">
+              <a:rPr lang="en-US" kern="0" dirty="0">
                 <a:solidFill>
                   <a:srgbClr val="002060"/>
                 </a:solidFill>
@@ -4094,18 +4278,26 @@
               </a:rPr>
               <a:t>Implicitly Typed Variables</a:t>
             </a:r>
-            <a:endParaRPr kumimoji="0" lang="en-US" sz="4800" b="1" i="0" u="none" strike="noStrike" kern="0" cap="none" spc="0" normalizeH="0" baseline="0" noProof="0">
-              <a:ln>
-                <a:noFill/>
-              </a:ln>
-              <a:solidFill>
-                <a:srgbClr val="002060"/>
-              </a:solidFill>
-              <a:effectLst/>
-              <a:uLnTx/>
-              <a:uFillTx/>
-              <a:latin typeface="Cambria" panose="02040503050406030204" pitchFamily="18" charset="0"/>
-            </a:endParaRPr>
+          </a:p>
+          <a:p>
+            <a:pPr lvl="0">
+              <a:defRPr/>
+            </a:pPr>
+            <a:r>
+              <a:rPr kumimoji="0" lang="en-US" sz="4800" b="1" i="0" u="none" strike="noStrike" kern="0" cap="none" spc="0" normalizeH="0" baseline="0" noProof="0" dirty="0">
+                <a:ln>
+                  <a:noFill/>
+                </a:ln>
+                <a:solidFill>
+                  <a:srgbClr val="002060"/>
+                </a:solidFill>
+                <a:effectLst/>
+                <a:uLnTx/>
+                <a:uFillTx/>
+                <a:latin typeface="Cambria" panose="02040503050406030204" pitchFamily="18" charset="0"/>
+              </a:rPr>
+              <a:t>(biền nội suy)</a:t>
+            </a:r>
           </a:p>
         </p:txBody>
       </p:sp>
@@ -4686,6 +4878,38 @@
               <a:rPr lang="en-US" sz="3200" dirty="0"/>
               <a:t>	• “3/10/2010”  -&gt; string, not date</a:t>
             </a:r>
+          </a:p>
+        </p:txBody>
+      </p:sp>
+      <p:sp>
+        <p:nvSpPr>
+          <p:cNvPr id="8" name="TextBox 7">
+            <a:extLst>
+              <a:ext uri="{FF2B5EF4-FFF2-40B4-BE49-F238E27FC236}">
+                <a16:creationId xmlns:a16="http://schemas.microsoft.com/office/drawing/2014/main" id="{124B893A-4641-00E9-EE43-E420ADD71AB2}"/>
+              </a:ext>
+            </a:extLst>
+          </p:cNvPr>
+          <p:cNvSpPr txBox="1"/>
+          <p:nvPr/>
+        </p:nvSpPr>
+        <p:spPr>
+          <a:xfrm>
+            <a:off x="655210" y="4876800"/>
+            <a:ext cx="6507590" cy="369332"/>
+          </a:xfrm>
+          <a:prstGeom prst="rect">
+            <a:avLst/>
+          </a:prstGeom>
+          <a:noFill/>
+        </p:spPr>
+        <p:txBody>
+          <a:bodyPr wrap="square" rtlCol="0">
+            <a:spAutoFit/>
+          </a:bodyPr>
+          <a:lstStyle/>
+          <a:p>
+            <a:endParaRPr lang="en-US" dirty="0"/>
           </a:p>
         </p:txBody>
       </p:sp>

</xml_diff>